<commit_message>
add experiments & analysis
</commit_message>
<xml_diff>
--- a/planning/experimental_plan_p56xx.pptx
+++ b/planning/experimental_plan_p56xx.pptx
@@ -6,6 +6,8 @@
   </p:sldMasterIdLst>
   <p:sldIdLst>
     <p:sldId id="262" r:id="rId2"/>
+    <p:sldId id="263" r:id="rId3"/>
+    <p:sldId id="264" r:id="rId4"/>
   </p:sldIdLst>
   <p:sldSz cx="12192000" cy="6858000"/>
   <p:notesSz cx="6858000" cy="9144000"/>
@@ -259,7 +261,7 @@
           <a:p>
             <a:fld id="{40DBAB5B-7A5A-7947-97A8-7ACC617A7DE1}" type="datetimeFigureOut">
               <a:rPr lang="en-US" smtClean="0"/>
-              <a:t>12/6/21</a:t>
+              <a:t>12/8/21</a:t>
             </a:fld>
             <a:endParaRPr lang="en-US"/>
           </a:p>
@@ -457,7 +459,7 @@
           <a:p>
             <a:fld id="{40DBAB5B-7A5A-7947-97A8-7ACC617A7DE1}" type="datetimeFigureOut">
               <a:rPr lang="en-US" smtClean="0"/>
-              <a:t>12/6/21</a:t>
+              <a:t>12/8/21</a:t>
             </a:fld>
             <a:endParaRPr lang="en-US"/>
           </a:p>
@@ -665,7 +667,7 @@
           <a:p>
             <a:fld id="{40DBAB5B-7A5A-7947-97A8-7ACC617A7DE1}" type="datetimeFigureOut">
               <a:rPr lang="en-US" smtClean="0"/>
-              <a:t>12/6/21</a:t>
+              <a:t>12/8/21</a:t>
             </a:fld>
             <a:endParaRPr lang="en-US"/>
           </a:p>
@@ -863,7 +865,7 @@
           <a:p>
             <a:fld id="{40DBAB5B-7A5A-7947-97A8-7ACC617A7DE1}" type="datetimeFigureOut">
               <a:rPr lang="en-US" smtClean="0"/>
-              <a:t>12/6/21</a:t>
+              <a:t>12/8/21</a:t>
             </a:fld>
             <a:endParaRPr lang="en-US"/>
           </a:p>
@@ -1138,7 +1140,7 @@
           <a:p>
             <a:fld id="{40DBAB5B-7A5A-7947-97A8-7ACC617A7DE1}" type="datetimeFigureOut">
               <a:rPr lang="en-US" smtClean="0"/>
-              <a:t>12/6/21</a:t>
+              <a:t>12/8/21</a:t>
             </a:fld>
             <a:endParaRPr lang="en-US"/>
           </a:p>
@@ -1403,7 +1405,7 @@
           <a:p>
             <a:fld id="{40DBAB5B-7A5A-7947-97A8-7ACC617A7DE1}" type="datetimeFigureOut">
               <a:rPr lang="en-US" smtClean="0"/>
-              <a:t>12/6/21</a:t>
+              <a:t>12/8/21</a:t>
             </a:fld>
             <a:endParaRPr lang="en-US"/>
           </a:p>
@@ -1815,7 +1817,7 @@
           <a:p>
             <a:fld id="{40DBAB5B-7A5A-7947-97A8-7ACC617A7DE1}" type="datetimeFigureOut">
               <a:rPr lang="en-US" smtClean="0"/>
-              <a:t>12/6/21</a:t>
+              <a:t>12/8/21</a:t>
             </a:fld>
             <a:endParaRPr lang="en-US"/>
           </a:p>
@@ -1956,7 +1958,7 @@
           <a:p>
             <a:fld id="{40DBAB5B-7A5A-7947-97A8-7ACC617A7DE1}" type="datetimeFigureOut">
               <a:rPr lang="en-US" smtClean="0"/>
-              <a:t>12/6/21</a:t>
+              <a:t>12/8/21</a:t>
             </a:fld>
             <a:endParaRPr lang="en-US"/>
           </a:p>
@@ -2069,7 +2071,7 @@
           <a:p>
             <a:fld id="{40DBAB5B-7A5A-7947-97A8-7ACC617A7DE1}" type="datetimeFigureOut">
               <a:rPr lang="en-US" smtClean="0"/>
-              <a:t>12/6/21</a:t>
+              <a:t>12/8/21</a:t>
             </a:fld>
             <a:endParaRPr lang="en-US"/>
           </a:p>
@@ -2380,7 +2382,7 @@
           <a:p>
             <a:fld id="{40DBAB5B-7A5A-7947-97A8-7ACC617A7DE1}" type="datetimeFigureOut">
               <a:rPr lang="en-US" smtClean="0"/>
-              <a:t>12/6/21</a:t>
+              <a:t>12/8/21</a:t>
             </a:fld>
             <a:endParaRPr lang="en-US"/>
           </a:p>
@@ -2668,7 +2670,7 @@
           <a:p>
             <a:fld id="{40DBAB5B-7A5A-7947-97A8-7ACC617A7DE1}" type="datetimeFigureOut">
               <a:rPr lang="en-US" smtClean="0"/>
-              <a:t>12/6/21</a:t>
+              <a:t>12/8/21</a:t>
             </a:fld>
             <a:endParaRPr lang="en-US"/>
           </a:p>
@@ -2909,7 +2911,7 @@
           <a:p>
             <a:fld id="{40DBAB5B-7A5A-7947-97A8-7ACC617A7DE1}" type="datetimeFigureOut">
               <a:rPr lang="en-US" smtClean="0"/>
-              <a:t>12/6/21</a:t>
+              <a:t>12/8/21</a:t>
             </a:fld>
             <a:endParaRPr lang="en-US"/>
           </a:p>
@@ -3340,8 +3342,8 @@
         </p:nvSpPr>
         <p:spPr>
           <a:xfrm>
-            <a:off x="3736219" y="316173"/>
-            <a:ext cx="4796506" cy="830997"/>
+            <a:off x="3736224" y="316173"/>
+            <a:ext cx="4796505" cy="800219"/>
           </a:xfrm>
           <a:prstGeom prst="rect">
             <a:avLst/>
@@ -3390,14 +3392,14 @@
           <p:nvPr>
             <p:extLst>
               <p:ext uri="{D42A27DB-BD31-4B8C-83A1-F6EECF244321}">
-                <p14:modId xmlns:p14="http://schemas.microsoft.com/office/powerpoint/2010/main" val="2917057034"/>
+                <p14:modId xmlns:p14="http://schemas.microsoft.com/office/powerpoint/2010/main" val="2896385085"/>
               </p:ext>
             </p:extLst>
           </p:nvPr>
         </p:nvGraphicFramePr>
         <p:xfrm>
           <a:off x="1176849" y="1407744"/>
-          <a:ext cx="7065208" cy="1899920"/>
+          <a:ext cx="7065208" cy="2143760"/>
         </p:xfrm>
         <a:graphic>
           <a:graphicData uri="http://schemas.openxmlformats.org/drawingml/2006/table">
@@ -3523,7 +3525,16 @@
                           <a:latin typeface="Arial" panose="020B0604020202020204" pitchFamily="34" charset="0"/>
                           <a:cs typeface="Arial" panose="020B0604020202020204" pitchFamily="34" charset="0"/>
                         </a:rPr>
-                        <a:t> = [0.2, 0.4, 0.6, 0.4, 0.8, 0.4, 1.0]MPa @ 1.0Hz</a:t>
+                        <a:t> = [0.2, 0.4, 0.6, 0.8, 1.0]MPa @ 1.0Hz x 2</a:t>
+                      </a:r>
+                    </a:p>
+                    <a:p>
+                      <a:r>
+                        <a:rPr lang="en-US" sz="1600" b="0" dirty="0">
+                          <a:latin typeface="Arial" panose="020B0604020202020204" pitchFamily="34" charset="0"/>
+                          <a:cs typeface="Arial" panose="020B0604020202020204" pitchFamily="34" charset="0"/>
+                        </a:rPr>
+                        <a:t>[1, 1, 1, 1] MPa</a:t>
                       </a:r>
                     </a:p>
                   </a:txBody>
@@ -5541,6 +5552,807 @@
     <p:extLst>
       <p:ext uri="{BB962C8B-B14F-4D97-AF65-F5344CB8AC3E}">
         <p14:creationId xmlns:p14="http://schemas.microsoft.com/office/powerpoint/2010/main" val="2570285202"/>
+      </p:ext>
+    </p:extLst>
+  </p:cSld>
+  <p:clrMapOvr>
+    <a:masterClrMapping/>
+  </p:clrMapOvr>
+</p:sld>
+</file>
+
+<file path=ppt/slides/slide2.xml><?xml version="1.0" encoding="utf-8"?>
+<p:sld xmlns:a="http://schemas.openxmlformats.org/drawingml/2006/main" xmlns:r="http://schemas.openxmlformats.org/officeDocument/2006/relationships" xmlns:p="http://schemas.openxmlformats.org/presentationml/2006/main">
+  <p:cSld>
+    <p:bg>
+      <p:bgPr>
+        <a:solidFill>
+          <a:schemeClr val="tx1"/>
+        </a:solidFill>
+        <a:effectLst/>
+      </p:bgPr>
+    </p:bg>
+    <p:spTree>
+      <p:nvGrpSpPr>
+        <p:cNvPr id="1" name=""/>
+        <p:cNvGrpSpPr/>
+        <p:nvPr/>
+      </p:nvGrpSpPr>
+      <p:grpSpPr>
+        <a:xfrm>
+          <a:off x="0" y="0"/>
+          <a:ext cx="0" cy="0"/>
+          <a:chOff x="0" y="0"/>
+          <a:chExt cx="0" cy="0"/>
+        </a:xfrm>
+      </p:grpSpPr>
+      <p:grpSp>
+        <p:nvGrpSpPr>
+          <p:cNvPr id="7" name="Group 6">
+            <a:extLst>
+              <a:ext uri="{FF2B5EF4-FFF2-40B4-BE49-F238E27FC236}">
+                <a16:creationId xmlns:a16="http://schemas.microsoft.com/office/drawing/2014/main" id="{92AE92FC-D83C-B946-88D6-49CCA18371AB}"/>
+              </a:ext>
+            </a:extLst>
+          </p:cNvPr>
+          <p:cNvGrpSpPr/>
+          <p:nvPr/>
+        </p:nvGrpSpPr>
+        <p:grpSpPr>
+          <a:xfrm>
+            <a:off x="356060" y="2"/>
+            <a:ext cx="11336587" cy="6857998"/>
+            <a:chOff x="356060" y="1"/>
+            <a:chExt cx="11336587" cy="6857998"/>
+          </a:xfrm>
+        </p:grpSpPr>
+        <p:grpSp>
+          <p:nvGrpSpPr>
+            <p:cNvPr id="8" name="Group 7">
+              <a:extLst>
+                <a:ext uri="{FF2B5EF4-FFF2-40B4-BE49-F238E27FC236}">
+                  <a16:creationId xmlns:a16="http://schemas.microsoft.com/office/drawing/2014/main" id="{617DF9D8-BCE5-3C41-B951-45FC05F9F3E4}"/>
+                </a:ext>
+              </a:extLst>
+            </p:cNvPr>
+            <p:cNvGrpSpPr/>
+            <p:nvPr/>
+          </p:nvGrpSpPr>
+          <p:grpSpPr>
+            <a:xfrm>
+              <a:off x="356060" y="1"/>
+              <a:ext cx="6837781" cy="6857998"/>
+              <a:chOff x="64230" y="1"/>
+              <a:chExt cx="6837781" cy="6857998"/>
+            </a:xfrm>
+          </p:grpSpPr>
+          <p:grpSp>
+            <p:nvGrpSpPr>
+              <p:cNvPr id="13" name="Group 12">
+                <a:extLst>
+                  <a:ext uri="{FF2B5EF4-FFF2-40B4-BE49-F238E27FC236}">
+                    <a16:creationId xmlns:a16="http://schemas.microsoft.com/office/drawing/2014/main" id="{520BDA11-FF50-8D48-9D9C-589CD80683BC}"/>
+                  </a:ext>
+                </a:extLst>
+              </p:cNvPr>
+              <p:cNvGrpSpPr/>
+              <p:nvPr/>
+            </p:nvGrpSpPr>
+            <p:grpSpPr>
+              <a:xfrm>
+                <a:off x="64230" y="1"/>
+                <a:ext cx="6837781" cy="6857998"/>
+                <a:chOff x="64230" y="1"/>
+                <a:chExt cx="6837781" cy="6857998"/>
+              </a:xfrm>
+            </p:grpSpPr>
+            <p:pic>
+              <p:nvPicPr>
+                <p:cNvPr id="16" name="Picture 2">
+                  <a:extLst>
+                    <a:ext uri="{FF2B5EF4-FFF2-40B4-BE49-F238E27FC236}">
+                      <a16:creationId xmlns:a16="http://schemas.microsoft.com/office/drawing/2014/main" id="{E20CE16C-F5AD-9945-B74A-A62098E70C54}"/>
+                    </a:ext>
+                  </a:extLst>
+                </p:cNvPr>
+                <p:cNvPicPr>
+                  <a:picLocks noChangeAspect="1" noChangeArrowheads="1"/>
+                </p:cNvPicPr>
+                <p:nvPr/>
+              </p:nvPicPr>
+              <p:blipFill>
+                <a:blip r:embed="rId2">
+                  <a:extLst>
+                    <a:ext uri="{28A0092B-C50C-407E-A947-70E740481C1C}">
+                      <a14:useLocalDpi xmlns:a14="http://schemas.microsoft.com/office/drawing/2010/main" val="0"/>
+                    </a:ext>
+                  </a:extLst>
+                </a:blip>
+                <a:srcRect/>
+                <a:stretch>
+                  <a:fillRect/>
+                </a:stretch>
+              </p:blipFill>
+              <p:spPr bwMode="auto">
+                <a:xfrm>
+                  <a:off x="124055" y="1"/>
+                  <a:ext cx="6777956" cy="3465760"/>
+                </a:xfrm>
+                <a:prstGeom prst="rect">
+                  <a:avLst/>
+                </a:prstGeom>
+                <a:noFill/>
+                <a:extLst>
+                  <a:ext uri="{909E8E84-426E-40DD-AFC4-6F175D3DCCD1}">
+                    <a14:hiddenFill xmlns:a14="http://schemas.microsoft.com/office/drawing/2010/main">
+                      <a:solidFill>
+                        <a:srgbClr val="FFFFFF"/>
+                      </a:solidFill>
+                    </a14:hiddenFill>
+                  </a:ext>
+                </a:extLst>
+              </p:spPr>
+            </p:pic>
+            <p:grpSp>
+              <p:nvGrpSpPr>
+                <p:cNvPr id="17" name="Group 16">
+                  <a:extLst>
+                    <a:ext uri="{FF2B5EF4-FFF2-40B4-BE49-F238E27FC236}">
+                      <a16:creationId xmlns:a16="http://schemas.microsoft.com/office/drawing/2014/main" id="{77D70761-F716-EB4F-92F9-A8DCA5785B62}"/>
+                    </a:ext>
+                  </a:extLst>
+                </p:cNvPr>
+                <p:cNvGrpSpPr/>
+                <p:nvPr/>
+              </p:nvGrpSpPr>
+              <p:grpSpPr>
+                <a:xfrm>
+                  <a:off x="64230" y="3392239"/>
+                  <a:ext cx="6831686" cy="3465760"/>
+                  <a:chOff x="64230" y="3392239"/>
+                  <a:chExt cx="6831686" cy="3465760"/>
+                </a:xfrm>
+              </p:grpSpPr>
+              <p:pic>
+                <p:nvPicPr>
+                  <p:cNvPr id="18" name="Picture 17">
+                    <a:extLst>
+                      <a:ext uri="{FF2B5EF4-FFF2-40B4-BE49-F238E27FC236}">
+                        <a16:creationId xmlns:a16="http://schemas.microsoft.com/office/drawing/2014/main" id="{813E48ED-71BA-D947-B3A2-C3042BA50753}"/>
+                      </a:ext>
+                    </a:extLst>
+                  </p:cNvPr>
+                  <p:cNvPicPr>
+                    <a:picLocks noChangeAspect="1" noChangeArrowheads="1"/>
+                  </p:cNvPicPr>
+                  <p:nvPr/>
+                </p:nvPicPr>
+                <p:blipFill>
+                  <a:blip r:embed="rId3">
+                    <a:extLst>
+                      <a:ext uri="{28A0092B-C50C-407E-A947-70E740481C1C}">
+                        <a14:useLocalDpi xmlns:a14="http://schemas.microsoft.com/office/drawing/2010/main" val="0"/>
+                      </a:ext>
+                    </a:extLst>
+                  </a:blip>
+                  <a:srcRect/>
+                  <a:stretch>
+                    <a:fillRect/>
+                  </a:stretch>
+                </p:blipFill>
+                <p:spPr bwMode="auto">
+                  <a:xfrm>
+                    <a:off x="78893" y="3446825"/>
+                    <a:ext cx="6817023" cy="3411174"/>
+                  </a:xfrm>
+                  <a:prstGeom prst="rect">
+                    <a:avLst/>
+                  </a:prstGeom>
+                  <a:noFill/>
+                  <a:extLst>
+                    <a:ext uri="{909E8E84-426E-40DD-AFC4-6F175D3DCCD1}">
+                      <a14:hiddenFill xmlns:a14="http://schemas.microsoft.com/office/drawing/2010/main">
+                        <a:solidFill>
+                          <a:srgbClr val="FFFFFF"/>
+                        </a:solidFill>
+                      </a14:hiddenFill>
+                    </a:ext>
+                  </a:extLst>
+                </p:spPr>
+              </p:pic>
+              <p:pic>
+                <p:nvPicPr>
+                  <p:cNvPr id="19" name="Picture 2">
+                    <a:extLst>
+                      <a:ext uri="{FF2B5EF4-FFF2-40B4-BE49-F238E27FC236}">
+                        <a16:creationId xmlns:a16="http://schemas.microsoft.com/office/drawing/2014/main" id="{353C8B92-0B99-5E48-A118-2CA7D7811F34}"/>
+                      </a:ext>
+                    </a:extLst>
+                  </p:cNvPr>
+                  <p:cNvPicPr>
+                    <a:picLocks noChangeAspect="1" noChangeArrowheads="1"/>
+                  </p:cNvPicPr>
+                  <p:nvPr/>
+                </p:nvPicPr>
+                <p:blipFill rotWithShape="1">
+                  <a:blip r:embed="rId2">
+                    <a:extLst>
+                      <a:ext uri="{28A0092B-C50C-407E-A947-70E740481C1C}">
+                        <a14:useLocalDpi xmlns:a14="http://schemas.microsoft.com/office/drawing/2010/main" val="0"/>
+                      </a:ext>
+                    </a:extLst>
+                  </a:blip>
+                  <a:srcRect r="96993"/>
+                  <a:stretch/>
+                </p:blipFill>
+                <p:spPr bwMode="auto">
+                  <a:xfrm>
+                    <a:off x="64230" y="3392239"/>
+                    <a:ext cx="203823" cy="3465760"/>
+                  </a:xfrm>
+                  <a:prstGeom prst="rect">
+                    <a:avLst/>
+                  </a:prstGeom>
+                  <a:noFill/>
+                  <a:extLst>
+                    <a:ext uri="{909E8E84-426E-40DD-AFC4-6F175D3DCCD1}">
+                      <a14:hiddenFill xmlns:a14="http://schemas.microsoft.com/office/drawing/2010/main">
+                        <a:solidFill>
+                          <a:srgbClr val="FFFFFF"/>
+                        </a:solidFill>
+                      </a14:hiddenFill>
+                    </a:ext>
+                  </a:extLst>
+                </p:spPr>
+              </p:pic>
+            </p:grpSp>
+          </p:grpSp>
+          <p:sp>
+            <p:nvSpPr>
+              <p:cNvPr id="14" name="TextBox 13">
+                <a:extLst>
+                  <a:ext uri="{FF2B5EF4-FFF2-40B4-BE49-F238E27FC236}">
+                    <a16:creationId xmlns:a16="http://schemas.microsoft.com/office/drawing/2014/main" id="{392E2A0B-442E-C742-ABEE-AFEEC074412B}"/>
+                  </a:ext>
+                </a:extLst>
+              </p:cNvPr>
+              <p:cNvSpPr txBox="1"/>
+              <p:nvPr/>
+            </p:nvSpPr>
+            <p:spPr>
+              <a:xfrm>
+                <a:off x="642026" y="3520347"/>
+                <a:ext cx="838691" cy="369332"/>
+              </a:xfrm>
+              <a:prstGeom prst="rect">
+                <a:avLst/>
+              </a:prstGeom>
+              <a:noFill/>
+            </p:spPr>
+            <p:txBody>
+              <a:bodyPr wrap="none" rtlCol="0">
+                <a:spAutoFit/>
+              </a:bodyPr>
+              <a:lstStyle/>
+              <a:p>
+                <a:r>
+                  <a:rPr lang="en-US" b="1" i="1" dirty="0">
+                    <a:solidFill>
+                      <a:schemeClr val="bg1"/>
+                    </a:solidFill>
+                    <a:latin typeface="Arial" panose="020B0604020202020204" pitchFamily="34" charset="0"/>
+                    <a:cs typeface="Arial" panose="020B0604020202020204" pitchFamily="34" charset="0"/>
+                  </a:rPr>
+                  <a:t>p5458</a:t>
+                </a:r>
+              </a:p>
+            </p:txBody>
+          </p:sp>
+          <p:sp>
+            <p:nvSpPr>
+              <p:cNvPr id="15" name="TextBox 14">
+                <a:extLst>
+                  <a:ext uri="{FF2B5EF4-FFF2-40B4-BE49-F238E27FC236}">
+                    <a16:creationId xmlns:a16="http://schemas.microsoft.com/office/drawing/2014/main" id="{E5EB90BE-BEE8-8D43-9020-6E70F1484775}"/>
+                  </a:ext>
+                </a:extLst>
+              </p:cNvPr>
+              <p:cNvSpPr txBox="1"/>
+              <p:nvPr/>
+            </p:nvSpPr>
+            <p:spPr>
+              <a:xfrm>
+                <a:off x="642026" y="116186"/>
+                <a:ext cx="838691" cy="369332"/>
+              </a:xfrm>
+              <a:prstGeom prst="rect">
+                <a:avLst/>
+              </a:prstGeom>
+              <a:noFill/>
+            </p:spPr>
+            <p:txBody>
+              <a:bodyPr wrap="none" rtlCol="0">
+                <a:spAutoFit/>
+              </a:bodyPr>
+              <a:lstStyle/>
+              <a:p>
+                <a:r>
+                  <a:rPr lang="en-US" b="1" i="1" dirty="0">
+                    <a:solidFill>
+                      <a:schemeClr val="bg1"/>
+                    </a:solidFill>
+                    <a:latin typeface="Arial" panose="020B0604020202020204" pitchFamily="34" charset="0"/>
+                    <a:cs typeface="Arial" panose="020B0604020202020204" pitchFamily="34" charset="0"/>
+                  </a:rPr>
+                  <a:t>p5462</a:t>
+                </a:r>
+              </a:p>
+            </p:txBody>
+          </p:sp>
+        </p:grpSp>
+        <p:grpSp>
+          <p:nvGrpSpPr>
+            <p:cNvPr id="9" name="Group 8">
+              <a:extLst>
+                <a:ext uri="{FF2B5EF4-FFF2-40B4-BE49-F238E27FC236}">
+                  <a16:creationId xmlns:a16="http://schemas.microsoft.com/office/drawing/2014/main" id="{7DC58CFC-A87E-1C43-A4B5-79361BE6F38E}"/>
+                </a:ext>
+              </a:extLst>
+            </p:cNvPr>
+            <p:cNvGrpSpPr/>
+            <p:nvPr/>
+          </p:nvGrpSpPr>
+          <p:grpSpPr>
+            <a:xfrm>
+              <a:off x="8259053" y="100878"/>
+              <a:ext cx="3433594" cy="6689025"/>
+              <a:chOff x="7967223" y="100878"/>
+              <a:chExt cx="3433594" cy="6689025"/>
+            </a:xfrm>
+          </p:grpSpPr>
+          <p:pic>
+            <p:nvPicPr>
+              <p:cNvPr id="11" name="Picture 2">
+                <a:extLst>
+                  <a:ext uri="{FF2B5EF4-FFF2-40B4-BE49-F238E27FC236}">
+                    <a16:creationId xmlns:a16="http://schemas.microsoft.com/office/drawing/2014/main" id="{DE82AAAF-C34C-E64F-AD51-75E7C75BC005}"/>
+                  </a:ext>
+                </a:extLst>
+              </p:cNvPr>
+              <p:cNvPicPr>
+                <a:picLocks noChangeAspect="1" noChangeArrowheads="1"/>
+              </p:cNvPicPr>
+              <p:nvPr/>
+            </p:nvPicPr>
+            <p:blipFill>
+              <a:blip r:embed="rId4">
+                <a:extLst>
+                  <a:ext uri="{28A0092B-C50C-407E-A947-70E740481C1C}">
+                    <a14:useLocalDpi xmlns:a14="http://schemas.microsoft.com/office/drawing/2010/main" val="0"/>
+                  </a:ext>
+                </a:extLst>
+              </a:blip>
+              <a:srcRect/>
+              <a:stretch>
+                <a:fillRect/>
+              </a:stretch>
+            </p:blipFill>
+            <p:spPr bwMode="auto">
+              <a:xfrm>
+                <a:off x="7967223" y="3582048"/>
+                <a:ext cx="3433593" cy="3207855"/>
+              </a:xfrm>
+              <a:prstGeom prst="rect">
+                <a:avLst/>
+              </a:prstGeom>
+              <a:noFill/>
+              <a:extLst>
+                <a:ext uri="{909E8E84-426E-40DD-AFC4-6F175D3DCCD1}">
+                  <a14:hiddenFill xmlns:a14="http://schemas.microsoft.com/office/drawing/2010/main">
+                    <a:solidFill>
+                      <a:srgbClr val="FFFFFF"/>
+                    </a:solidFill>
+                  </a14:hiddenFill>
+                </a:ext>
+              </a:extLst>
+            </p:spPr>
+          </p:pic>
+          <p:pic>
+            <p:nvPicPr>
+              <p:cNvPr id="12" name="Picture 4">
+                <a:extLst>
+                  <a:ext uri="{FF2B5EF4-FFF2-40B4-BE49-F238E27FC236}">
+                    <a16:creationId xmlns:a16="http://schemas.microsoft.com/office/drawing/2014/main" id="{737CF846-83F1-8B47-9ACF-3C1F1CC7D287}"/>
+                  </a:ext>
+                </a:extLst>
+              </p:cNvPr>
+              <p:cNvPicPr>
+                <a:picLocks noChangeAspect="1" noChangeArrowheads="1"/>
+              </p:cNvPicPr>
+              <p:nvPr/>
+            </p:nvPicPr>
+            <p:blipFill>
+              <a:blip r:embed="rId5">
+                <a:extLst>
+                  <a:ext uri="{28A0092B-C50C-407E-A947-70E740481C1C}">
+                    <a14:useLocalDpi xmlns:a14="http://schemas.microsoft.com/office/drawing/2010/main" val="0"/>
+                  </a:ext>
+                </a:extLst>
+              </a:blip>
+              <a:srcRect/>
+              <a:stretch>
+                <a:fillRect/>
+              </a:stretch>
+            </p:blipFill>
+            <p:spPr bwMode="auto">
+              <a:xfrm>
+                <a:off x="7967224" y="100878"/>
+                <a:ext cx="3433593" cy="3260026"/>
+              </a:xfrm>
+              <a:prstGeom prst="rect">
+                <a:avLst/>
+              </a:prstGeom>
+              <a:noFill/>
+              <a:extLst>
+                <a:ext uri="{909E8E84-426E-40DD-AFC4-6F175D3DCCD1}">
+                  <a14:hiddenFill xmlns:a14="http://schemas.microsoft.com/office/drawing/2010/main">
+                    <a:solidFill>
+                      <a:srgbClr val="FFFFFF"/>
+                    </a:solidFill>
+                  </a14:hiddenFill>
+                </a:ext>
+              </a:extLst>
+            </p:spPr>
+          </p:pic>
+        </p:grpSp>
+        <p:cxnSp>
+          <p:nvCxnSpPr>
+            <p:cNvPr id="10" name="Straight Connector 9">
+              <a:extLst>
+                <a:ext uri="{FF2B5EF4-FFF2-40B4-BE49-F238E27FC236}">
+                  <a16:creationId xmlns:a16="http://schemas.microsoft.com/office/drawing/2014/main" id="{E48ED0AE-7462-A340-B324-9CC184DDB4D4}"/>
+                </a:ext>
+              </a:extLst>
+            </p:cNvPr>
+            <p:cNvCxnSpPr/>
+            <p:nvPr/>
+          </p:nvCxnSpPr>
+          <p:spPr>
+            <a:xfrm>
+              <a:off x="7772403" y="100878"/>
+              <a:ext cx="0" cy="6624536"/>
+            </a:xfrm>
+            <a:prstGeom prst="line">
+              <a:avLst/>
+            </a:prstGeom>
+            <a:ln w="25400">
+              <a:solidFill>
+                <a:schemeClr val="bg1"/>
+              </a:solidFill>
+            </a:ln>
+          </p:spPr>
+          <p:style>
+            <a:lnRef idx="1">
+              <a:schemeClr val="accent1"/>
+            </a:lnRef>
+            <a:fillRef idx="0">
+              <a:schemeClr val="accent1"/>
+            </a:fillRef>
+            <a:effectRef idx="0">
+              <a:schemeClr val="accent1"/>
+            </a:effectRef>
+            <a:fontRef idx="minor">
+              <a:schemeClr val="tx1"/>
+            </a:fontRef>
+          </p:style>
+        </p:cxnSp>
+      </p:grpSp>
+    </p:spTree>
+    <p:extLst>
+      <p:ext uri="{BB962C8B-B14F-4D97-AF65-F5344CB8AC3E}">
+        <p14:creationId xmlns:p14="http://schemas.microsoft.com/office/powerpoint/2010/main" val="1630144493"/>
+      </p:ext>
+    </p:extLst>
+  </p:cSld>
+  <p:clrMapOvr>
+    <a:masterClrMapping/>
+  </p:clrMapOvr>
+</p:sld>
+</file>
+
+<file path=ppt/slides/slide3.xml><?xml version="1.0" encoding="utf-8"?>
+<p:sld xmlns:a="http://schemas.openxmlformats.org/drawingml/2006/main" xmlns:r="http://schemas.openxmlformats.org/officeDocument/2006/relationships" xmlns:p="http://schemas.openxmlformats.org/presentationml/2006/main">
+  <p:cSld>
+    <p:spTree>
+      <p:nvGrpSpPr>
+        <p:cNvPr id="1" name=""/>
+        <p:cNvGrpSpPr/>
+        <p:nvPr/>
+      </p:nvGrpSpPr>
+      <p:grpSpPr>
+        <a:xfrm>
+          <a:off x="0" y="0"/>
+          <a:ext cx="0" cy="0"/>
+          <a:chOff x="0" y="0"/>
+          <a:chExt cx="0" cy="0"/>
+        </a:xfrm>
+      </p:grpSpPr>
+      <p:sp>
+        <p:nvSpPr>
+          <p:cNvPr id="4" name="TextBox 3">
+            <a:extLst>
+              <a:ext uri="{FF2B5EF4-FFF2-40B4-BE49-F238E27FC236}">
+                <a16:creationId xmlns:a16="http://schemas.microsoft.com/office/drawing/2014/main" id="{69B56764-1634-1444-BE73-B092FAB1BA0F}"/>
+              </a:ext>
+            </a:extLst>
+          </p:cNvPr>
+          <p:cNvSpPr txBox="1"/>
+          <p:nvPr/>
+        </p:nvSpPr>
+        <p:spPr>
+          <a:xfrm>
+            <a:off x="3804356" y="316173"/>
+            <a:ext cx="4660251" cy="523220"/>
+          </a:xfrm>
+          <a:prstGeom prst="rect">
+            <a:avLst/>
+          </a:prstGeom>
+          <a:noFill/>
+        </p:spPr>
+        <p:txBody>
+          <a:bodyPr wrap="none" rtlCol="0">
+            <a:spAutoFit/>
+          </a:bodyPr>
+          <a:lstStyle/>
+          <a:p>
+            <a:pPr algn="ctr"/>
+            <a:r>
+              <a:rPr lang="en-US" sz="2800" b="1" i="1" dirty="0">
+                <a:latin typeface="Arial" panose="020B0604020202020204" pitchFamily="34" charset="0"/>
+                <a:cs typeface="Arial" panose="020B0604020202020204" pitchFamily="34" charset="0"/>
+              </a:rPr>
+              <a:t>Relevant Info &amp; Questions</a:t>
+            </a:r>
+            <a:endParaRPr lang="en-US" i="1" dirty="0">
+              <a:latin typeface="Arial" panose="020B0604020202020204" pitchFamily="34" charset="0"/>
+              <a:cs typeface="Arial" panose="020B0604020202020204" pitchFamily="34" charset="0"/>
+            </a:endParaRPr>
+          </a:p>
+        </p:txBody>
+      </p:sp>
+      <p:sp>
+        <p:nvSpPr>
+          <p:cNvPr id="2" name="TextBox 1">
+            <a:extLst>
+              <a:ext uri="{FF2B5EF4-FFF2-40B4-BE49-F238E27FC236}">
+                <a16:creationId xmlns:a16="http://schemas.microsoft.com/office/drawing/2014/main" id="{BA165F55-4BEF-CB47-9667-5732102A8A3B}"/>
+              </a:ext>
+            </a:extLst>
+          </p:cNvPr>
+          <p:cNvSpPr txBox="1"/>
+          <p:nvPr/>
+        </p:nvSpPr>
+        <p:spPr>
+          <a:xfrm>
+            <a:off x="1278610" y="1185620"/>
+            <a:ext cx="9012265" cy="4832092"/>
+          </a:xfrm>
+          <a:prstGeom prst="rect">
+            <a:avLst/>
+          </a:prstGeom>
+          <a:noFill/>
+        </p:spPr>
+        <p:txBody>
+          <a:bodyPr wrap="square" rtlCol="0">
+            <a:spAutoFit/>
+          </a:bodyPr>
+          <a:lstStyle/>
+          <a:p>
+            <a:pPr marL="285750" indent="-285750">
+              <a:buFont typeface="Arial" panose="020B0604020202020204" pitchFamily="34" charset="0"/>
+              <a:buChar char="•"/>
+            </a:pPr>
+            <a:r>
+              <a:rPr lang="en-US" sz="1400" dirty="0">
+                <a:latin typeface="Arial" panose="020B0604020202020204" pitchFamily="34" charset="0"/>
+                <a:cs typeface="Arial" panose="020B0604020202020204" pitchFamily="34" charset="0"/>
+              </a:rPr>
+              <a:t>Part of this project would be to use pressure sensitive film to characterize stress-area</a:t>
+            </a:r>
+          </a:p>
+          <a:p>
+            <a:pPr marL="742950" lvl="1" indent="-285750">
+              <a:buFont typeface="Arial" panose="020B0604020202020204" pitchFamily="34" charset="0"/>
+              <a:buChar char="•"/>
+            </a:pPr>
+            <a:r>
+              <a:rPr lang="en-US" sz="1400" dirty="0">
+                <a:latin typeface="Arial" panose="020B0604020202020204" pitchFamily="34" charset="0"/>
+                <a:cs typeface="Arial" panose="020B0604020202020204" pitchFamily="34" charset="0"/>
+              </a:rPr>
+              <a:t>This can inform which PZTs to use. </a:t>
+            </a:r>
+            <a:r>
+              <a:rPr lang="en-US" sz="1400" dirty="0" err="1">
+                <a:latin typeface="Arial" panose="020B0604020202020204" pitchFamily="34" charset="0"/>
+                <a:cs typeface="Arial" panose="020B0604020202020204" pitchFamily="34" charset="0"/>
+              </a:rPr>
+              <a:t>I’’m</a:t>
+            </a:r>
+            <a:r>
+              <a:rPr lang="en-US" sz="1400" dirty="0">
+                <a:latin typeface="Arial" panose="020B0604020202020204" pitchFamily="34" charset="0"/>
+                <a:cs typeface="Arial" panose="020B0604020202020204" pitchFamily="34" charset="0"/>
+              </a:rPr>
+              <a:t> thinking just the middle column will be sufficient</a:t>
+            </a:r>
+          </a:p>
+          <a:p>
+            <a:pPr marL="285750" indent="-285750">
+              <a:buFont typeface="Arial" panose="020B0604020202020204" pitchFamily="34" charset="0"/>
+              <a:buChar char="•"/>
+            </a:pPr>
+            <a:r>
+              <a:rPr lang="en-US" sz="1400" dirty="0">
+                <a:latin typeface="Arial" panose="020B0604020202020204" pitchFamily="34" charset="0"/>
+                <a:cs typeface="Arial" panose="020B0604020202020204" pitchFamily="34" charset="0"/>
+              </a:rPr>
+              <a:t>We’re at ~89% usage of database — maybe increase storage capacity (25TB to 30TB…?)</a:t>
+            </a:r>
+          </a:p>
+          <a:p>
+            <a:pPr marL="285750" indent="-285750">
+              <a:buFont typeface="Arial" panose="020B0604020202020204" pitchFamily="34" charset="0"/>
+              <a:buChar char="•"/>
+            </a:pPr>
+            <a:r>
+              <a:rPr lang="en-US" sz="1400" dirty="0">
+                <a:latin typeface="Arial" panose="020B0604020202020204" pitchFamily="34" charset="0"/>
+                <a:cs typeface="Arial" panose="020B0604020202020204" pitchFamily="34" charset="0"/>
+              </a:rPr>
+              <a:t>I plan to do this after AGU — 18-21 December. I can do the pressure sensitive film part this week. </a:t>
+            </a:r>
+          </a:p>
+          <a:p>
+            <a:pPr marL="285750" indent="-285750">
+              <a:buFont typeface="Arial" panose="020B0604020202020204" pitchFamily="34" charset="0"/>
+              <a:buChar char="•"/>
+            </a:pPr>
+            <a:endParaRPr lang="en-US" sz="1400" dirty="0">
+              <a:latin typeface="Arial" panose="020B0604020202020204" pitchFamily="34" charset="0"/>
+              <a:cs typeface="Arial" panose="020B0604020202020204" pitchFamily="34" charset="0"/>
+            </a:endParaRPr>
+          </a:p>
+          <a:p>
+            <a:r>
+              <a:rPr lang="en-US" sz="1400" i="1" dirty="0">
+                <a:latin typeface="Arial" panose="020B0604020202020204" pitchFamily="34" charset="0"/>
+                <a:cs typeface="Arial" panose="020B0604020202020204" pitchFamily="34" charset="0"/>
+              </a:rPr>
+              <a:t>Permeability</a:t>
+            </a:r>
+            <a:r>
+              <a:rPr lang="en-US" sz="1400" dirty="0">
+                <a:latin typeface="Arial" panose="020B0604020202020204" pitchFamily="34" charset="0"/>
+                <a:cs typeface="Arial" panose="020B0604020202020204" pitchFamily="34" charset="0"/>
+              </a:rPr>
+              <a:t> — I’m going through some old slide decks to confirm, but yes I think that I’ve checked the permeability. It is very important, especially regarding Pp oscillations. I’ll talk more about this on Wednesday. </a:t>
+            </a:r>
+          </a:p>
+          <a:p>
+            <a:br>
+              <a:rPr lang="en-US" sz="1400" dirty="0">
+                <a:latin typeface="Arial" panose="020B0604020202020204" pitchFamily="34" charset="0"/>
+                <a:cs typeface="Arial" panose="020B0604020202020204" pitchFamily="34" charset="0"/>
+              </a:rPr>
+            </a:br>
+            <a:endParaRPr lang="en-US" sz="1400" dirty="0">
+              <a:latin typeface="Arial" panose="020B0604020202020204" pitchFamily="34" charset="0"/>
+              <a:cs typeface="Arial" panose="020B0604020202020204" pitchFamily="34" charset="0"/>
+            </a:endParaRPr>
+          </a:p>
+          <a:p>
+            <a:r>
+              <a:rPr lang="en-US" sz="1400" i="1" dirty="0">
+                <a:latin typeface="Arial" panose="020B0604020202020204" pitchFamily="34" charset="0"/>
+                <a:cs typeface="Arial" panose="020B0604020202020204" pitchFamily="34" charset="0"/>
+              </a:rPr>
+              <a:t>Oscillation Protocol and Amplitudes</a:t>
+            </a:r>
+            <a:r>
+              <a:rPr lang="en-US" sz="1400" dirty="0">
+                <a:latin typeface="Arial" panose="020B0604020202020204" pitchFamily="34" charset="0"/>
+                <a:cs typeface="Arial" panose="020B0604020202020204" pitchFamily="34" charset="0"/>
+              </a:rPr>
+              <a:t> — Maybe I could modify Amp2,4 so that I focus on larger amplitudes. Irreversibility is most apparent at the larger oscillation amplitudes, so maybe just repeating 1MPa is sufficient.</a:t>
+            </a:r>
+          </a:p>
+          <a:p>
+            <a:r>
+              <a:rPr lang="en-US" sz="1400" dirty="0">
+                <a:latin typeface="Arial" panose="020B0604020202020204" pitchFamily="34" charset="0"/>
+                <a:cs typeface="Arial" panose="020B0604020202020204" pitchFamily="34" charset="0"/>
+              </a:rPr>
+              <a:t>Something like...</a:t>
+            </a:r>
+          </a:p>
+          <a:p>
+            <a:r>
+              <a:rPr lang="en-US" sz="1400" dirty="0">
+                <a:latin typeface="Arial" panose="020B0604020202020204" pitchFamily="34" charset="0"/>
+                <a:cs typeface="Arial" panose="020B0604020202020204" pitchFamily="34" charset="0"/>
+              </a:rPr>
+              <a:t>[1, 1, 1, 1, 1, 1, 1]MPa @ 1 Hz</a:t>
+            </a:r>
+          </a:p>
+          <a:p>
+            <a:r>
+              <a:rPr lang="en-US" sz="1400" dirty="0">
+                <a:latin typeface="Arial" panose="020B0604020202020204" pitchFamily="34" charset="0"/>
+                <a:cs typeface="Arial" panose="020B0604020202020204" pitchFamily="34" charset="0"/>
+              </a:rPr>
+              <a:t>OR</a:t>
+            </a:r>
+          </a:p>
+          <a:p>
+            <a:r>
+              <a:rPr lang="en-US" sz="1400" dirty="0">
+                <a:latin typeface="Arial" panose="020B0604020202020204" pitchFamily="34" charset="0"/>
+                <a:cs typeface="Arial" panose="020B0604020202020204" pitchFamily="34" charset="0"/>
+              </a:rPr>
+              <a:t>[0.8, 1, 0.8, 1, 0.8, 1]MP @ 1 Hz</a:t>
+            </a:r>
+          </a:p>
+          <a:p>
+            <a:br>
+              <a:rPr lang="en-US" sz="1400" dirty="0">
+                <a:latin typeface="Arial" panose="020B0604020202020204" pitchFamily="34" charset="0"/>
+                <a:cs typeface="Arial" panose="020B0604020202020204" pitchFamily="34" charset="0"/>
+              </a:rPr>
+            </a:br>
+            <a:endParaRPr lang="en-US" sz="1400" dirty="0">
+              <a:latin typeface="Arial" panose="020B0604020202020204" pitchFamily="34" charset="0"/>
+              <a:cs typeface="Arial" panose="020B0604020202020204" pitchFamily="34" charset="0"/>
+            </a:endParaRPr>
+          </a:p>
+          <a:p>
+            <a:r>
+              <a:rPr lang="en-US" sz="1400" i="1" dirty="0">
+                <a:latin typeface="Arial" panose="020B0604020202020204" pitchFamily="34" charset="0"/>
+                <a:cs typeface="Arial" panose="020B0604020202020204" pitchFamily="34" charset="0"/>
+              </a:rPr>
+              <a:t>Stress Levels</a:t>
+            </a:r>
+            <a:r>
+              <a:rPr lang="en-US" sz="1400" dirty="0">
+                <a:latin typeface="Arial" panose="020B0604020202020204" pitchFamily="34" charset="0"/>
+                <a:cs typeface="Arial" panose="020B0604020202020204" pitchFamily="34" charset="0"/>
+              </a:rPr>
+              <a:t> — My main motivation for 3 stress levels is to keep the experiment short enough to be completed in 1 day to prevent unnecessarily long holds and/or load/reloads. After I use pressure sensitive film, I will have a better idea if small changes in contact area are resolvable. </a:t>
+            </a:r>
+          </a:p>
+          <a:p>
+            <a:pPr marL="285750" indent="-285750">
+              <a:buFont typeface="Arial" panose="020B0604020202020204" pitchFamily="34" charset="0"/>
+              <a:buChar char="•"/>
+            </a:pPr>
+            <a:endParaRPr lang="en-US" sz="1400" dirty="0">
+              <a:latin typeface="Arial" panose="020B0604020202020204" pitchFamily="34" charset="0"/>
+              <a:cs typeface="Arial" panose="020B0604020202020204" pitchFamily="34" charset="0"/>
+            </a:endParaRPr>
+          </a:p>
+          <a:p>
+            <a:endParaRPr lang="en-US" sz="1400" dirty="0">
+              <a:latin typeface="Arial" panose="020B0604020202020204" pitchFamily="34" charset="0"/>
+              <a:cs typeface="Arial" panose="020B0604020202020204" pitchFamily="34" charset="0"/>
+            </a:endParaRPr>
+          </a:p>
+        </p:txBody>
+      </p:sp>
+    </p:spTree>
+    <p:extLst>
+      <p:ext uri="{BB962C8B-B14F-4D97-AF65-F5344CB8AC3E}">
+        <p14:creationId xmlns:p14="http://schemas.microsoft.com/office/powerpoint/2010/main" val="2480460687"/>
       </p:ext>
     </p:extLst>
   </p:cSld>

</xml_diff>